<commit_message>
Ajout diag colab acheter surnom
</commit_message>
<xml_diff>
--- a/diagramme-collaboration1.pptx
+++ b/diagramme-collaboration1.pptx
@@ -104,6 +104,11 @@
       </a:defRPr>
     </a:lvl9pPr>
   </p:defaultTextStyle>
+  <p:extLst>
+    <p:ext uri="{EFAFB233-063F-42B5-8137-9DF3F51BA10A}">
+      <p15:sldGuideLst xmlns:p15="http://schemas.microsoft.com/office/powerpoint/2012/main"/>
+    </p:ext>
+  </p:extLst>
 </p:presentation>
 </file>
 
@@ -3365,8 +3370,8 @@
         </p:nvSpPr>
         <p:spPr>
           <a:xfrm>
-            <a:off x="3634030" y="1215976"/>
-            <a:ext cx="4118966" cy="1477328"/>
+            <a:off x="3468567" y="1816415"/>
+            <a:ext cx="4118966" cy="923330"/>
           </a:xfrm>
           <a:prstGeom prst="rect">
             <a:avLst/>
@@ -3379,9 +3384,10 @@
           </a:bodyPr>
           <a:lstStyle/>
           <a:p>
+            <a:pPr algn="ctr"/>
             <a:r>
-              <a:rPr lang="fr-FR" dirty="0" err="1"/>
-              <a:t>Demande_Positionnement_Acceptee</a:t>
+              <a:rPr lang="fr-FR" dirty="0"/>
+              <a:t>DEMANDE_POSITIONNEMENT_ACCEPTEE</a:t>
             </a:r>
             <a:r>
               <a:rPr lang="fr-FR" dirty="0">
@@ -3391,32 +3397,61 @@
             </a:r>
           </a:p>
           <a:p>
+            <a:pPr algn="ctr"/>
             <a:r>
-              <a:rPr lang="fr-FR" dirty="0" err="1"/>
-              <a:t>Demande_Positionnement_Refusee</a:t>
+              <a:rPr lang="fr-FR" dirty="0"/>
+              <a:t>DEMANDE_POSITIONNEMENT_REFUSEE</a:t>
             </a:r>
-            <a:endParaRPr lang="fr-FR" dirty="0"/>
-          </a:p>
-          <a:p>
+          </a:p>
+          <a:p>
+            <a:pPr algn="ctr"/>
             <a:r>
-              <a:rPr lang="fr-FR" dirty="0" err="1"/>
-              <a:t>Sponsor_Demande_Positionnement</a:t>
+              <a:rPr lang="fr-FR" dirty="0"/>
+              <a:t>SPONSOR_DEMANDE_POSITIONNEMENT</a:t>
             </a:r>
-            <a:endParaRPr lang="fr-FR" dirty="0"/>
-          </a:p>
-          <a:p>
+          </a:p>
+        </p:txBody>
+      </p:sp>
+      <p:sp>
+        <p:nvSpPr>
+          <p:cNvPr id="12" name="ZoneTexte 11">
+            <a:extLst>
+              <a:ext uri="{FF2B5EF4-FFF2-40B4-BE49-F238E27FC236}">
+                <a16:creationId xmlns:a16="http://schemas.microsoft.com/office/drawing/2014/main" id="{091C0A15-9255-F44B-BF14-681DFE38444E}"/>
+              </a:ext>
+            </a:extLst>
+          </p:cNvPr>
+          <p:cNvSpPr txBox="1"/>
+          <p:nvPr/>
+        </p:nvSpPr>
+        <p:spPr>
+          <a:xfrm>
+            <a:off x="3468567" y="3064634"/>
+            <a:ext cx="4118966" cy="646331"/>
+          </a:xfrm>
+          <a:prstGeom prst="rect">
+            <a:avLst/>
+          </a:prstGeom>
+          <a:noFill/>
+        </p:spPr>
+        <p:txBody>
+          <a:bodyPr wrap="square" rtlCol="0">
+            <a:spAutoFit/>
+          </a:bodyPr>
+          <a:lstStyle/>
+          <a:p>
+            <a:pPr algn="ctr"/>
             <a:r>
-              <a:rPr lang="fr-FR" dirty="0" err="1"/>
-              <a:t>Générer_MDP_données</a:t>
+              <a:rPr lang="fr-FR" dirty="0"/>
+              <a:t>GÉNÉRER_MDP_DONNÉES</a:t>
             </a:r>
-            <a:endParaRPr lang="fr-FR" dirty="0"/>
-          </a:p>
-          <a:p>
+          </a:p>
+          <a:p>
+            <a:pPr algn="ctr"/>
             <a:r>
-              <a:rPr lang="fr-FR" dirty="0" err="1"/>
-              <a:t>Notifier_Décision</a:t>
+              <a:rPr lang="fr-FR" dirty="0"/>
+              <a:t>NOTIFIER_DÉCISION</a:t>
             </a:r>
-            <a:endParaRPr lang="fr-FR" dirty="0"/>
           </a:p>
         </p:txBody>
       </p:sp>

</xml_diff>